<commit_message>
started rewriting some code
</commit_message>
<xml_diff>
--- a/ConnectFour/Presentatie Assesment.pptx
+++ b/ConnectFour/Presentatie Assesment.pptx
@@ -15,6 +15,7 @@
     <p:sldId id="261" r:id="rId10"/>
     <p:sldId id="262" r:id="rId11"/>
     <p:sldId id="263" r:id="rId12"/>
+    <p:sldId id="264" r:id="rId13"/>
   </p:sldIdLst>
   <p:sldSz cx="10080625" cy="5670550"/>
   <p:notesSz cx="7559675" cy="10691812"/>
@@ -4283,7 +4284,7 @@
             <a:noAutofit/>
           </a:bodyPr>
           <a:p>
-            <a:fld id="{1497985A-8382-4397-B29E-75ACF3456308}" type="author">
+            <a:fld id="{352B5F76-9E47-4C8C-994A-35E676DEA035}" type="author">
               <a:rPr b="0" lang="en-US" sz="1800" spc="-1" strike="noStrike">
                 <a:latin typeface="Arial"/>
               </a:rPr>
@@ -4655,7 +4656,7 @@
           </a:bodyPr>
           <a:p>
             <a:pPr algn="r"/>
-            <a:fld id="{86A80AD1-9B99-40B2-A49B-6EAA06502F6F}" type="slidenum">
+            <a:fld id="{24E99B39-7445-480F-A4FF-1FD372D6A79D}" type="slidenum">
               <a:rPr b="0" lang="en-US" sz="1400" spc="-1" strike="noStrike">
                 <a:latin typeface="Arial"/>
               </a:rPr>
@@ -5027,7 +5028,7 @@
           </a:bodyPr>
           <a:p>
             <a:pPr algn="r"/>
-            <a:fld id="{2AA1455F-DA19-49B4-B22F-252E1D43285B}" type="slidenum">
+            <a:fld id="{757750F2-919E-4413-98D5-131759A9D056}" type="slidenum">
               <a:rPr b="0" lang="en-US" sz="1400" spc="-1" strike="noStrike">
                 <a:latin typeface="Arial"/>
               </a:rPr>
@@ -5389,7 +5390,7 @@
               <a:rPr b="0" lang="en-US" sz="4400" spc="-1" strike="noStrike">
                 <a:latin typeface="Arial"/>
               </a:rPr>
-              <a:t>Connect Four</a:t>
+              <a:t>Hoe dit assessment voor mij voelt</a:t>
             </a:r>
             <a:endParaRPr b="0" lang="en-US" sz="4400" spc="-1" strike="noStrike">
               <a:latin typeface="Arial"/>
@@ -5397,144 +5398,9 @@
           </a:p>
         </p:txBody>
       </p:sp>
-      <p:sp>
-        <p:nvSpPr>
-          <p:cNvPr id="127" name="TextShape 2"/>
-          <p:cNvSpPr txBox="1"/>
-          <p:nvPr/>
-        </p:nvSpPr>
-        <p:spPr>
-          <a:xfrm>
-            <a:off x="504000" y="1326600"/>
-            <a:ext cx="9072000" cy="3288240"/>
-          </a:xfrm>
-          <a:prstGeom prst="rect">
-            <a:avLst/>
-          </a:prstGeom>
-          <a:noFill/>
-          <a:ln>
-            <a:noFill/>
-          </a:ln>
-        </p:spPr>
-        <p:txBody>
-          <a:bodyPr lIns="0" rIns="0" tIns="0" bIns="0">
-            <a:normAutofit/>
-          </a:bodyPr>
-          <a:p>
-            <a:pPr marL="432000" indent="-324000">
-              <a:spcBef>
-                <a:spcPts val="1417"/>
-              </a:spcBef>
-              <a:buClr>
-                <a:srgbClr val="ffffff"/>
-              </a:buClr>
-              <a:buSzPct val="45000"/>
-              <a:buFont typeface="Wingdings" charset="2"/>
-              <a:buChar char=""/>
-            </a:pPr>
-            <a:r>
-              <a:rPr b="0" lang="en-US" sz="3200" spc="-1" strike="noStrike">
-                <a:latin typeface="Arial"/>
-              </a:rPr>
-              <a:t>3 Game Modes</a:t>
-            </a:r>
-            <a:endParaRPr b="0" lang="en-US" sz="3200" spc="-1" strike="noStrike">
-              <a:latin typeface="Arial"/>
-            </a:endParaRPr>
-          </a:p>
-          <a:p>
-            <a:pPr marL="432000" indent="-324000">
-              <a:spcBef>
-                <a:spcPts val="1417"/>
-              </a:spcBef>
-              <a:buClr>
-                <a:srgbClr val="ffffff"/>
-              </a:buClr>
-              <a:buSzPct val="45000"/>
-              <a:buFont typeface="Wingdings" charset="2"/>
-              <a:buChar char=""/>
-            </a:pPr>
-            <a:r>
-              <a:rPr b="0" lang="en-US" sz="3200" spc="-1" strike="noStrike">
-                <a:latin typeface="Arial"/>
-              </a:rPr>
-              <a:t>Adjustable board size</a:t>
-            </a:r>
-            <a:endParaRPr b="0" lang="en-US" sz="3200" spc="-1" strike="noStrike">
-              <a:latin typeface="Arial"/>
-            </a:endParaRPr>
-          </a:p>
-          <a:p>
-            <a:pPr marL="432000" indent="-324000">
-              <a:spcBef>
-                <a:spcPts val="1417"/>
-              </a:spcBef>
-              <a:buClr>
-                <a:srgbClr val="ffffff"/>
-              </a:buClr>
-              <a:buSzPct val="45000"/>
-              <a:buFont typeface="Wingdings" charset="2"/>
-              <a:buChar char=""/>
-            </a:pPr>
-            <a:r>
-              <a:rPr b="0" lang="en-US" sz="3200" spc="-1" strike="noStrike">
-                <a:latin typeface="Arial"/>
-              </a:rPr>
-              <a:t>Adjustable win length</a:t>
-            </a:r>
-            <a:endParaRPr b="0" lang="en-US" sz="3200" spc="-1" strike="noStrike">
-              <a:latin typeface="Arial"/>
-            </a:endParaRPr>
-          </a:p>
-          <a:p>
-            <a:pPr marL="432000" indent="-324000">
-              <a:spcBef>
-                <a:spcPts val="1417"/>
-              </a:spcBef>
-              <a:buClr>
-                <a:srgbClr val="ffffff"/>
-              </a:buClr>
-              <a:buSzPct val="45000"/>
-              <a:buFont typeface="Wingdings" charset="2"/>
-              <a:buChar char=""/>
-            </a:pPr>
-            <a:r>
-              <a:rPr b="0" lang="en-US" sz="3200" spc="-1" strike="noStrike">
-                <a:latin typeface="Arial"/>
-              </a:rPr>
-              <a:t>3 AI difficulties</a:t>
-            </a:r>
-            <a:endParaRPr b="0" lang="en-US" sz="3200" spc="-1" strike="noStrike">
-              <a:latin typeface="Arial"/>
-            </a:endParaRPr>
-          </a:p>
-          <a:p>
-            <a:pPr marL="432000" indent="-324000">
-              <a:spcBef>
-                <a:spcPts val="1417"/>
-              </a:spcBef>
-              <a:buClr>
-                <a:srgbClr val="ffffff"/>
-              </a:buClr>
-              <a:buSzPct val="45000"/>
-              <a:buFont typeface="Wingdings" charset="2"/>
-              <a:buChar char=""/>
-            </a:pPr>
-            <a:r>
-              <a:rPr b="0" lang="en-US" sz="3200" spc="-1" strike="noStrike">
-                <a:latin typeface="Arial"/>
-              </a:rPr>
-              <a:t>Korte Demo</a:t>
-            </a:r>
-            <a:endParaRPr b="0" lang="en-US" sz="3200" spc="-1" strike="noStrike">
-              <a:latin typeface="Arial"/>
-            </a:endParaRPr>
-          </a:p>
-        </p:txBody>
-      </p:sp>
       <p:pic>
         <p:nvPicPr>
-          <p:cNvPr id="128" name="" descr=""/>
+          <p:cNvPr id="127" name="" descr=""/>
           <p:cNvPicPr/>
           <p:nvPr/>
         </p:nvPicPr>
@@ -5544,8 +5410,8 @@
         </p:blipFill>
         <p:spPr>
           <a:xfrm>
-            <a:off x="6766560" y="1326600"/>
-            <a:ext cx="2809440" cy="3297960"/>
+            <a:off x="2362320" y="1259280"/>
+            <a:ext cx="5410080" cy="4044240"/>
           </a:xfrm>
           <a:prstGeom prst="rect">
             <a:avLst/>
@@ -5587,7 +5453,7 @@
       </p:grpSpPr>
       <p:sp>
         <p:nvSpPr>
-          <p:cNvPr id="129" name="TextShape 1"/>
+          <p:cNvPr id="128" name="TextShape 1"/>
           <p:cNvSpPr txBox="1"/>
           <p:nvPr/>
         </p:nvSpPr>
@@ -5614,7 +5480,7 @@
               <a:rPr b="0" lang="en-US" sz="4400" spc="-1" strike="noStrike">
                 <a:latin typeface="Arial"/>
               </a:rPr>
-              <a:t>Hoe werkt de AI</a:t>
+              <a:t>Connect Four</a:t>
             </a:r>
             <a:endParaRPr b="0" lang="en-US" sz="4400" spc="-1" strike="noStrike">
               <a:latin typeface="Arial"/>
@@ -5624,14 +5490,14 @@
       </p:sp>
       <p:sp>
         <p:nvSpPr>
-          <p:cNvPr id="130" name="TextShape 2"/>
+          <p:cNvPr id="129" name="TextShape 2"/>
           <p:cNvSpPr txBox="1"/>
           <p:nvPr/>
         </p:nvSpPr>
         <p:spPr>
           <a:xfrm>
             <a:off x="504000" y="1326600"/>
-            <a:ext cx="4426920" cy="3288240"/>
+            <a:ext cx="9072000" cy="3288240"/>
           </a:xfrm>
           <a:prstGeom prst="rect">
             <a:avLst/>
@@ -5643,7 +5509,7 @@
         </p:spPr>
         <p:txBody>
           <a:bodyPr lIns="0" rIns="0" tIns="0" bIns="0">
-            <a:normAutofit fontScale="27000"/>
+            <a:normAutofit/>
           </a:bodyPr>
           <a:p>
             <a:pPr marL="432000" indent="-324000">
@@ -5661,7 +5527,7 @@
               <a:rPr b="0" lang="en-US" sz="3200" spc="-1" strike="noStrike">
                 <a:latin typeface="Arial"/>
               </a:rPr>
-              <a:t>Minimax pattern</a:t>
+              <a:t>3 Game Modes</a:t>
             </a:r>
             <a:endParaRPr b="0" lang="en-US" sz="3200" spc="-1" strike="noStrike">
               <a:latin typeface="Arial"/>
@@ -5683,7 +5549,7 @@
               <a:rPr b="0" lang="en-US" sz="3200" spc="-1" strike="noStrike">
                 <a:latin typeface="Arial"/>
               </a:rPr>
-              <a:t>Het kijkt naar alle board-posities N stappen in de toekomst</a:t>
+              <a:t>Adjustable board size</a:t>
             </a:r>
             <a:endParaRPr b="0" lang="en-US" sz="3200" spc="-1" strike="noStrike">
               <a:latin typeface="Arial"/>
@@ -5705,7 +5571,7 @@
               <a:rPr b="0" lang="en-US" sz="3200" spc="-1" strike="noStrike">
                 <a:latin typeface="Arial"/>
               </a:rPr>
-              <a:t>Het selecteert het meest ideale pad dat hij kan vinden</a:t>
+              <a:t>Adjustable win length</a:t>
             </a:r>
             <a:endParaRPr b="0" lang="en-US" sz="3200" spc="-1" strike="noStrike">
               <a:latin typeface="Arial"/>
@@ -5727,7 +5593,7 @@
               <a:rPr b="0" lang="en-US" sz="3200" spc="-1" strike="noStrike">
                 <a:latin typeface="Arial"/>
               </a:rPr>
-              <a:t>Er is een kleine kans dat de AI een random zet doet</a:t>
+              <a:t>3 AI difficulties</a:t>
             </a:r>
             <a:endParaRPr b="0" lang="en-US" sz="3200" spc="-1" strike="noStrike">
               <a:latin typeface="Arial"/>
@@ -5749,82 +5615,8 @@
               <a:rPr b="0" lang="en-US" sz="3200" spc="-1" strike="noStrike">
                 <a:latin typeface="Arial"/>
               </a:rPr>
-              <a:t>Potentiele optimalisaties:</a:t>
+              <a:t>Korte Demo</a:t>
             </a:r>
-            <a:endParaRPr b="0" lang="en-US" sz="3200" spc="-1" strike="noStrike">
-              <a:latin typeface="Arial"/>
-            </a:endParaRPr>
-          </a:p>
-          <a:p>
-            <a:pPr lvl="1" marL="864000" indent="-324000">
-              <a:spcBef>
-                <a:spcPts val="1134"/>
-              </a:spcBef>
-              <a:buClr>
-                <a:srgbClr val="ffffff"/>
-              </a:buClr>
-              <a:buSzPct val="75000"/>
-              <a:buFont typeface="Symbol" charset="2"/>
-              <a:buChar char=""/>
-            </a:pPr>
-            <a:r>
-              <a:rPr b="0" lang="en-US" sz="2800" spc="-1" strike="noStrike">
-                <a:latin typeface="Arial"/>
-              </a:rPr>
-              <a:t>Alpha-Beta Pruning</a:t>
-            </a:r>
-            <a:endParaRPr b="0" lang="en-US" sz="2800" spc="-1" strike="noStrike">
-              <a:latin typeface="Arial"/>
-            </a:endParaRPr>
-          </a:p>
-          <a:p>
-            <a:pPr lvl="1" marL="864000" indent="-324000">
-              <a:spcBef>
-                <a:spcPts val="1134"/>
-              </a:spcBef>
-              <a:buClr>
-                <a:srgbClr val="ffffff"/>
-              </a:buClr>
-              <a:buSzPct val="75000"/>
-              <a:buFont typeface="Symbol" charset="2"/>
-              <a:buChar char=""/>
-            </a:pPr>
-            <a:r>
-              <a:rPr b="0" lang="en-US" sz="2800" spc="-1" strike="noStrike">
-                <a:latin typeface="Arial"/>
-              </a:rPr>
-              <a:t>Killer Heuristics</a:t>
-            </a:r>
-            <a:endParaRPr b="0" lang="en-US" sz="2800" spc="-1" strike="noStrike">
-              <a:latin typeface="Arial"/>
-            </a:endParaRPr>
-          </a:p>
-        </p:txBody>
-      </p:sp>
-      <p:sp>
-        <p:nvSpPr>
-          <p:cNvPr id="131" name="TextShape 3"/>
-          <p:cNvSpPr txBox="1"/>
-          <p:nvPr/>
-        </p:nvSpPr>
-        <p:spPr>
-          <a:xfrm>
-            <a:off x="5152680" y="1326600"/>
-            <a:ext cx="4426920" cy="3288240"/>
-          </a:xfrm>
-          <a:prstGeom prst="rect">
-            <a:avLst/>
-          </a:prstGeom>
-          <a:noFill/>
-          <a:ln>
-            <a:noFill/>
-          </a:ln>
-        </p:spPr>
-        <p:txBody>
-          <a:bodyPr lIns="0" rIns="0" tIns="0" bIns="0">
-            <a:normAutofit/>
-          </a:bodyPr>
-          <a:p>
             <a:endParaRPr b="0" lang="en-US" sz="3200" spc="-1" strike="noStrike">
               <a:latin typeface="Arial"/>
             </a:endParaRPr>
@@ -5833,7 +5625,7 @@
       </p:sp>
       <p:pic>
         <p:nvPicPr>
-          <p:cNvPr id="132" name="" descr=""/>
+          <p:cNvPr id="130" name="" descr=""/>
           <p:cNvPicPr/>
           <p:nvPr/>
         </p:nvPicPr>
@@ -5843,8 +5635,8 @@
         </p:blipFill>
         <p:spPr>
           <a:xfrm>
-            <a:off x="5032080" y="2103120"/>
-            <a:ext cx="4547520" cy="2443320"/>
+            <a:off x="6766560" y="1326600"/>
+            <a:ext cx="2809440" cy="3297960"/>
           </a:xfrm>
           <a:prstGeom prst="rect">
             <a:avLst/>
@@ -5886,7 +5678,7 @@
       </p:grpSpPr>
       <p:sp>
         <p:nvSpPr>
-          <p:cNvPr id="133" name="TextShape 1"/>
+          <p:cNvPr id="131" name="TextShape 1"/>
           <p:cNvSpPr txBox="1"/>
           <p:nvPr/>
         </p:nvSpPr>
@@ -5913,7 +5705,7 @@
               <a:rPr b="0" lang="en-US" sz="4400" spc="-1" strike="noStrike">
                 <a:latin typeface="Arial"/>
               </a:rPr>
-              <a:t>Werkwijze</a:t>
+              <a:t>Hoe werkt de AI</a:t>
             </a:r>
             <a:endParaRPr b="0" lang="en-US" sz="4400" spc="-1" strike="noStrike">
               <a:latin typeface="Arial"/>
@@ -5923,14 +5715,14 @@
       </p:sp>
       <p:sp>
         <p:nvSpPr>
-          <p:cNvPr id="134" name="TextShape 2"/>
+          <p:cNvPr id="132" name="TextShape 2"/>
           <p:cNvSpPr txBox="1"/>
           <p:nvPr/>
         </p:nvSpPr>
         <p:spPr>
           <a:xfrm>
             <a:off x="504000" y="1326600"/>
-            <a:ext cx="9072000" cy="3288240"/>
+            <a:ext cx="4426920" cy="3288240"/>
           </a:xfrm>
           <a:prstGeom prst="rect">
             <a:avLst/>
@@ -5942,7 +5734,7 @@
         </p:spPr>
         <p:txBody>
           <a:bodyPr lIns="0" rIns="0" tIns="0" bIns="0">
-            <a:normAutofit fontScale="94000"/>
+            <a:normAutofit fontScale="27000"/>
           </a:bodyPr>
           <a:p>
             <a:pPr marL="432000" indent="-324000">
@@ -5960,7 +5752,95 @@
               <a:rPr b="0" lang="en-US" sz="3200" spc="-1" strike="noStrike">
                 <a:latin typeface="Arial"/>
               </a:rPr>
-              <a:t>Simpel Word bestand met plannen</a:t>
+              <a:t>Minimax pattern</a:t>
+            </a:r>
+            <a:endParaRPr b="0" lang="en-US" sz="3200" spc="-1" strike="noStrike">
+              <a:latin typeface="Arial"/>
+            </a:endParaRPr>
+          </a:p>
+          <a:p>
+            <a:pPr marL="432000" indent="-324000">
+              <a:spcBef>
+                <a:spcPts val="1417"/>
+              </a:spcBef>
+              <a:buClr>
+                <a:srgbClr val="ffffff"/>
+              </a:buClr>
+              <a:buSzPct val="45000"/>
+              <a:buFont typeface="Wingdings" charset="2"/>
+              <a:buChar char=""/>
+            </a:pPr>
+            <a:r>
+              <a:rPr b="0" lang="en-US" sz="3200" spc="-1" strike="noStrike">
+                <a:latin typeface="Arial"/>
+              </a:rPr>
+              <a:t>Het kijkt naar alle board-posities N stappen in de toekomst</a:t>
+            </a:r>
+            <a:endParaRPr b="0" lang="en-US" sz="3200" spc="-1" strike="noStrike">
+              <a:latin typeface="Arial"/>
+            </a:endParaRPr>
+          </a:p>
+          <a:p>
+            <a:pPr marL="432000" indent="-324000">
+              <a:spcBef>
+                <a:spcPts val="1417"/>
+              </a:spcBef>
+              <a:buClr>
+                <a:srgbClr val="ffffff"/>
+              </a:buClr>
+              <a:buSzPct val="45000"/>
+              <a:buFont typeface="Wingdings" charset="2"/>
+              <a:buChar char=""/>
+            </a:pPr>
+            <a:r>
+              <a:rPr b="0" lang="en-US" sz="3200" spc="-1" strike="noStrike">
+                <a:latin typeface="Arial"/>
+              </a:rPr>
+              <a:t>Het selecteert het meest ideale pad dat hij kan vinden</a:t>
+            </a:r>
+            <a:endParaRPr b="0" lang="en-US" sz="3200" spc="-1" strike="noStrike">
+              <a:latin typeface="Arial"/>
+            </a:endParaRPr>
+          </a:p>
+          <a:p>
+            <a:pPr marL="432000" indent="-324000">
+              <a:spcBef>
+                <a:spcPts val="1417"/>
+              </a:spcBef>
+              <a:buClr>
+                <a:srgbClr val="ffffff"/>
+              </a:buClr>
+              <a:buSzPct val="45000"/>
+              <a:buFont typeface="Wingdings" charset="2"/>
+              <a:buChar char=""/>
+            </a:pPr>
+            <a:r>
+              <a:rPr b="0" lang="en-US" sz="3200" spc="-1" strike="noStrike">
+                <a:latin typeface="Arial"/>
+              </a:rPr>
+              <a:t>Er is een kleine kans dat de AI een random zet doet</a:t>
+            </a:r>
+            <a:endParaRPr b="0" lang="en-US" sz="3200" spc="-1" strike="noStrike">
+              <a:latin typeface="Arial"/>
+            </a:endParaRPr>
+          </a:p>
+          <a:p>
+            <a:pPr marL="432000" indent="-324000">
+              <a:spcBef>
+                <a:spcPts val="1417"/>
+              </a:spcBef>
+              <a:buClr>
+                <a:srgbClr val="ffffff"/>
+              </a:buClr>
+              <a:buSzPct val="45000"/>
+              <a:buFont typeface="Wingdings" charset="2"/>
+              <a:buChar char=""/>
+            </a:pPr>
+            <a:r>
+              <a:rPr b="0" lang="en-US" sz="3200" spc="-1" strike="noStrike">
+                <a:latin typeface="Arial"/>
+              </a:rPr>
+              <a:t>Potentiele optimalisaties:</a:t>
             </a:r>
             <a:endParaRPr b="0" lang="en-US" sz="3200" spc="-1" strike="noStrike">
               <a:latin typeface="Arial"/>
@@ -5982,7 +5862,7 @@
               <a:rPr b="0" lang="en-US" sz="2800" spc="-1" strike="noStrike">
                 <a:latin typeface="Arial"/>
               </a:rPr>
-              <a:t>Doel (4 op een rij)</a:t>
+              <a:t>Alpha-Beta Pruning</a:t>
             </a:r>
             <a:endParaRPr b="0" lang="en-US" sz="2800" spc="-1" strike="noStrike">
               <a:latin typeface="Arial"/>
@@ -6004,80 +5884,67 @@
               <a:rPr b="0" lang="en-US" sz="2800" spc="-1" strike="noStrike">
                 <a:latin typeface="Arial"/>
               </a:rPr>
-              <a:t>Win-Check</a:t>
+              <a:t>Killer Heuristics</a:t>
             </a:r>
             <a:endParaRPr b="0" lang="en-US" sz="2800" spc="-1" strike="noStrike">
               <a:latin typeface="Arial"/>
             </a:endParaRPr>
           </a:p>
-          <a:p>
-            <a:pPr lvl="1" marL="864000" indent="-324000">
-              <a:spcBef>
-                <a:spcPts val="1417"/>
-              </a:spcBef>
-              <a:buClr>
-                <a:srgbClr val="ffffff"/>
-              </a:buClr>
-              <a:buSzPct val="75000"/>
-              <a:buFont typeface="Symbol" charset="2"/>
-              <a:buChar char=""/>
-            </a:pPr>
-            <a:r>
-              <a:rPr b="0" lang="en-US" sz="2800" spc="-1" strike="noStrike">
-                <a:latin typeface="Arial"/>
-              </a:rPr>
-              <a:t>Extraatjes</a:t>
-            </a:r>
-            <a:endParaRPr b="0" lang="en-US" sz="2800" spc="-1" strike="noStrike">
-              <a:latin typeface="Arial"/>
-            </a:endParaRPr>
-          </a:p>
-          <a:p>
-            <a:pPr marL="432000" indent="-324000">
-              <a:spcBef>
-                <a:spcPts val="1417"/>
-              </a:spcBef>
-              <a:buClr>
-                <a:srgbClr val="ffffff"/>
-              </a:buClr>
-              <a:buSzPct val="45000"/>
-              <a:buFont typeface="Wingdings" charset="2"/>
-              <a:buChar char=""/>
-            </a:pPr>
-            <a:r>
-              <a:rPr b="0" lang="en-US" sz="3200" spc="-1" strike="noStrike">
-                <a:latin typeface="Arial"/>
-              </a:rPr>
-              <a:t>Begin met de basis → refactor en breid het uit</a:t>
-            </a:r>
-            <a:endParaRPr b="0" lang="en-US" sz="3200" spc="-1" strike="noStrike">
-              <a:latin typeface="Arial"/>
-            </a:endParaRPr>
-          </a:p>
-          <a:p>
-            <a:pPr marL="432000" indent="-324000">
-              <a:spcBef>
-                <a:spcPts val="1417"/>
-              </a:spcBef>
-              <a:buClr>
-                <a:srgbClr val="ffffff"/>
-              </a:buClr>
-              <a:buSzPct val="45000"/>
-              <a:buFont typeface="Wingdings" charset="2"/>
-              <a:buChar char=""/>
-            </a:pPr>
-            <a:r>
-              <a:rPr b="0" lang="en-US" sz="3200" spc="-1" strike="noStrike">
-                <a:latin typeface="Arial"/>
-              </a:rPr>
-              <a:t>Begin meer hard-coded → maak het dynamisch</a:t>
-            </a:r>
-            <a:endParaRPr b="0" lang="en-US" sz="3200" spc="-1" strike="noStrike">
-              <a:latin typeface="Arial"/>
-            </a:endParaRPr>
-          </a:p>
-        </p:txBody>
-      </p:sp>
+        </p:txBody>
+      </p:sp>
+      <p:sp>
+        <p:nvSpPr>
+          <p:cNvPr id="133" name="TextShape 3"/>
+          <p:cNvSpPr txBox="1"/>
+          <p:nvPr/>
+        </p:nvSpPr>
+        <p:spPr>
+          <a:xfrm>
+            <a:off x="5152680" y="1326600"/>
+            <a:ext cx="4426920" cy="3288240"/>
+          </a:xfrm>
+          <a:prstGeom prst="rect">
+            <a:avLst/>
+          </a:prstGeom>
+          <a:noFill/>
+          <a:ln>
+            <a:noFill/>
+          </a:ln>
+        </p:spPr>
+        <p:txBody>
+          <a:bodyPr lIns="0" rIns="0" tIns="0" bIns="0">
+            <a:normAutofit/>
+          </a:bodyPr>
+          <a:p>
+            <a:endParaRPr b="0" lang="en-US" sz="3200" spc="-1" strike="noStrike">
+              <a:latin typeface="Arial"/>
+            </a:endParaRPr>
+          </a:p>
+        </p:txBody>
+      </p:sp>
+      <p:pic>
+        <p:nvPicPr>
+          <p:cNvPr id="134" name="" descr=""/>
+          <p:cNvPicPr/>
+          <p:nvPr/>
+        </p:nvPicPr>
+        <p:blipFill>
+          <a:blip r:embed="rId1"/>
+          <a:stretch/>
+        </p:blipFill>
+        <p:spPr>
+          <a:xfrm>
+            <a:off x="5032080" y="2103120"/>
+            <a:ext cx="4547520" cy="2443320"/>
+          </a:xfrm>
+          <a:prstGeom prst="rect">
+            <a:avLst/>
+          </a:prstGeom>
+          <a:ln>
+            <a:noFill/>
+          </a:ln>
+        </p:spPr>
+      </p:pic>
     </p:spTree>
   </p:cSld>
   <mc:AlternateContent>
@@ -6116,8 +5983,8 @@
         </p:nvSpPr>
         <p:spPr>
           <a:xfrm>
-            <a:off x="144000" y="182880"/>
-            <a:ext cx="9540000" cy="1250280"/>
+            <a:off x="144000" y="72000"/>
+            <a:ext cx="9540000" cy="648000"/>
           </a:xfrm>
           <a:prstGeom prst="rect">
             <a:avLst/>
@@ -6137,7 +6004,7 @@
               <a:rPr b="0" lang="en-US" sz="4400" spc="-1" strike="noStrike">
                 <a:latin typeface="Arial"/>
               </a:rPr>
-              <a:t>Wat zou ik de volgende keer anders doen als ik meer tijd had</a:t>
+              <a:t>Werkwijze</a:t>
             </a:r>
             <a:endParaRPr b="0" lang="en-US" sz="4400" spc="-1" strike="noStrike">
               <a:latin typeface="Arial"/>
@@ -6153,7 +6020,7 @@
         </p:nvSpPr>
         <p:spPr>
           <a:xfrm>
-            <a:off x="504000" y="1645920"/>
+            <a:off x="504000" y="1326600"/>
             <a:ext cx="9072000" cy="3288240"/>
           </a:xfrm>
           <a:prstGeom prst="rect">
@@ -6166,7 +6033,7 @@
         </p:spPr>
         <p:txBody>
           <a:bodyPr lIns="0" rIns="0" tIns="0" bIns="0">
-            <a:normAutofit/>
+            <a:normAutofit fontScale="94000"/>
           </a:bodyPr>
           <a:p>
             <a:pPr marL="432000" indent="-324000">
@@ -6184,9 +6051,75 @@
               <a:rPr b="0" lang="en-US" sz="3200" spc="-1" strike="noStrike">
                 <a:latin typeface="Arial"/>
               </a:rPr>
-              <a:t>Wat bredere ontwerpen maken</a:t>
+              <a:t>Simpel Word bestand met plannen</a:t>
             </a:r>
             <a:endParaRPr b="0" lang="en-US" sz="3200" spc="-1" strike="noStrike">
+              <a:latin typeface="Arial"/>
+            </a:endParaRPr>
+          </a:p>
+          <a:p>
+            <a:pPr lvl="1" marL="864000" indent="-324000">
+              <a:spcBef>
+                <a:spcPts val="1134"/>
+              </a:spcBef>
+              <a:buClr>
+                <a:srgbClr val="ffffff"/>
+              </a:buClr>
+              <a:buSzPct val="75000"/>
+              <a:buFont typeface="Symbol" charset="2"/>
+              <a:buChar char=""/>
+            </a:pPr>
+            <a:r>
+              <a:rPr b="0" lang="en-US" sz="2800" spc="-1" strike="noStrike">
+                <a:latin typeface="Arial"/>
+              </a:rPr>
+              <a:t>Doel (4 op een rij)</a:t>
+            </a:r>
+            <a:endParaRPr b="0" lang="en-US" sz="2800" spc="-1" strike="noStrike">
+              <a:latin typeface="Arial"/>
+            </a:endParaRPr>
+          </a:p>
+          <a:p>
+            <a:pPr lvl="1" marL="864000" indent="-324000">
+              <a:spcBef>
+                <a:spcPts val="1134"/>
+              </a:spcBef>
+              <a:buClr>
+                <a:srgbClr val="ffffff"/>
+              </a:buClr>
+              <a:buSzPct val="75000"/>
+              <a:buFont typeface="Symbol" charset="2"/>
+              <a:buChar char=""/>
+            </a:pPr>
+            <a:r>
+              <a:rPr b="0" lang="en-US" sz="2800" spc="-1" strike="noStrike">
+                <a:latin typeface="Arial"/>
+              </a:rPr>
+              <a:t>Win-Check</a:t>
+            </a:r>
+            <a:endParaRPr b="0" lang="en-US" sz="2800" spc="-1" strike="noStrike">
+              <a:latin typeface="Arial"/>
+            </a:endParaRPr>
+          </a:p>
+          <a:p>
+            <a:pPr lvl="1" marL="864000" indent="-324000">
+              <a:spcBef>
+                <a:spcPts val="1417"/>
+              </a:spcBef>
+              <a:buClr>
+                <a:srgbClr val="ffffff"/>
+              </a:buClr>
+              <a:buSzPct val="75000"/>
+              <a:buFont typeface="Symbol" charset="2"/>
+              <a:buChar char=""/>
+            </a:pPr>
+            <a:r>
+              <a:rPr b="0" lang="en-US" sz="2800" spc="-1" strike="noStrike">
+                <a:latin typeface="Arial"/>
+              </a:rPr>
+              <a:t>Extraatjes</a:t>
+            </a:r>
+            <a:endParaRPr b="0" lang="en-US" sz="2800" spc="-1" strike="noStrike">
               <a:latin typeface="Arial"/>
             </a:endParaRPr>
           </a:p>
@@ -6206,7 +6139,29 @@
               <a:rPr b="0" lang="en-US" sz="3200" spc="-1" strike="noStrike">
                 <a:latin typeface="Arial"/>
               </a:rPr>
-              <a:t>Meer mijn best doen om de code makkelijk aanpasbaar te maken</a:t>
+              <a:t>Begin met de basis → refactor en breid het uit</a:t>
+            </a:r>
+            <a:endParaRPr b="0" lang="en-US" sz="3200" spc="-1" strike="noStrike">
+              <a:latin typeface="Arial"/>
+            </a:endParaRPr>
+          </a:p>
+          <a:p>
+            <a:pPr marL="432000" indent="-324000">
+              <a:spcBef>
+                <a:spcPts val="1417"/>
+              </a:spcBef>
+              <a:buClr>
+                <a:srgbClr val="ffffff"/>
+              </a:buClr>
+              <a:buSzPct val="45000"/>
+              <a:buFont typeface="Wingdings" charset="2"/>
+              <a:buChar char=""/>
+            </a:pPr>
+            <a:r>
+              <a:rPr b="0" lang="en-US" sz="3200" spc="-1" strike="noStrike">
+                <a:latin typeface="Arial"/>
+              </a:rPr>
+              <a:t>Begin meer hard-coded → maak het dynamisch</a:t>
             </a:r>
             <a:endParaRPr b="0" lang="en-US" sz="3200" spc="-1" strike="noStrike">
               <a:latin typeface="Arial"/>
@@ -6252,7 +6207,7 @@
         </p:nvSpPr>
         <p:spPr>
           <a:xfrm>
-            <a:off x="144000" y="121320"/>
+            <a:off x="144000" y="182880"/>
             <a:ext cx="9540000" cy="1250280"/>
           </a:xfrm>
           <a:prstGeom prst="rect">
@@ -6273,7 +6228,7 @@
               <a:rPr b="0" lang="en-US" sz="4400" spc="-1" strike="noStrike">
                 <a:latin typeface="Arial"/>
               </a:rPr>
-              <a:t>Waarom wil ik graag bij Vitas Young Talen</a:t>
+              <a:t>Wat zou ik de volgende keer anders doen als ik meer tijd had</a:t>
             </a:r>
             <a:endParaRPr b="0" lang="en-US" sz="4400" spc="-1" strike="noStrike">
               <a:latin typeface="Arial"/>
@@ -6289,7 +6244,7 @@
         </p:nvSpPr>
         <p:spPr>
           <a:xfrm>
-            <a:off x="504000" y="1650600"/>
+            <a:off x="504000" y="1645920"/>
             <a:ext cx="9072000" cy="3288240"/>
           </a:xfrm>
           <a:prstGeom prst="rect">
@@ -6320,7 +6275,7 @@
               <a:rPr b="0" lang="en-US" sz="3200" spc="-1" strike="noStrike">
                 <a:latin typeface="Arial"/>
               </a:rPr>
-              <a:t>De begeleiding die ze bieden, samen met het leertraject, ziet er interessant voor mij uit</a:t>
+              <a:t>Wat bredere ontwerpen maken</a:t>
             </a:r>
             <a:endParaRPr b="0" lang="en-US" sz="3200" spc="-1" strike="noStrike">
               <a:latin typeface="Arial"/>
@@ -6342,7 +6297,7 @@
               <a:rPr b="0" lang="en-US" sz="3200" spc="-1" strike="noStrike">
                 <a:latin typeface="Arial"/>
               </a:rPr>
-              <a:t>*gegarandeerde vaste positie na 1 jaar</a:t>
+              <a:t>Meer mijn best doen om de code makkelijk aanpasbaar te maken</a:t>
             </a:r>
             <a:endParaRPr b="0" lang="en-US" sz="3200" spc="-1" strike="noStrike">
               <a:latin typeface="Arial"/>
@@ -6383,6 +6338,142 @@
       <p:sp>
         <p:nvSpPr>
           <p:cNvPr id="139" name="TextShape 1"/>
+          <p:cNvSpPr txBox="1"/>
+          <p:nvPr/>
+        </p:nvSpPr>
+        <p:spPr>
+          <a:xfrm>
+            <a:off x="144000" y="121320"/>
+            <a:ext cx="9540000" cy="1250280"/>
+          </a:xfrm>
+          <a:prstGeom prst="rect">
+            <a:avLst/>
+          </a:prstGeom>
+          <a:noFill/>
+          <a:ln>
+            <a:noFill/>
+          </a:ln>
+        </p:spPr>
+        <p:txBody>
+          <a:bodyPr lIns="0" rIns="0" tIns="0" bIns="0" anchor="ctr">
+            <a:noAutofit/>
+          </a:bodyPr>
+          <a:p>
+            <a:pPr algn="ctr"/>
+            <a:r>
+              <a:rPr b="0" lang="en-US" sz="4400" spc="-1" strike="noStrike">
+                <a:latin typeface="Arial"/>
+              </a:rPr>
+              <a:t>Waarom wil ik graag bij Vitas Young Talen</a:t>
+            </a:r>
+            <a:endParaRPr b="0" lang="en-US" sz="4400" spc="-1" strike="noStrike">
+              <a:latin typeface="Arial"/>
+            </a:endParaRPr>
+          </a:p>
+        </p:txBody>
+      </p:sp>
+      <p:sp>
+        <p:nvSpPr>
+          <p:cNvPr id="140" name="TextShape 2"/>
+          <p:cNvSpPr txBox="1"/>
+          <p:nvPr/>
+        </p:nvSpPr>
+        <p:spPr>
+          <a:xfrm>
+            <a:off x="504000" y="1650600"/>
+            <a:ext cx="9072000" cy="3288240"/>
+          </a:xfrm>
+          <a:prstGeom prst="rect">
+            <a:avLst/>
+          </a:prstGeom>
+          <a:noFill/>
+          <a:ln>
+            <a:noFill/>
+          </a:ln>
+        </p:spPr>
+        <p:txBody>
+          <a:bodyPr lIns="0" rIns="0" tIns="0" bIns="0">
+            <a:normAutofit/>
+          </a:bodyPr>
+          <a:p>
+            <a:pPr marL="432000" indent="-324000">
+              <a:spcBef>
+                <a:spcPts val="1417"/>
+              </a:spcBef>
+              <a:buClr>
+                <a:srgbClr val="ffffff"/>
+              </a:buClr>
+              <a:buSzPct val="45000"/>
+              <a:buFont typeface="Wingdings" charset="2"/>
+              <a:buChar char=""/>
+            </a:pPr>
+            <a:r>
+              <a:rPr b="0" lang="en-US" sz="3200" spc="-1" strike="noStrike">
+                <a:latin typeface="Arial"/>
+              </a:rPr>
+              <a:t>De begeleiding die ze bieden, samen met het leertraject, ziet er interessant voor mij uit</a:t>
+            </a:r>
+            <a:endParaRPr b="0" lang="en-US" sz="3200" spc="-1" strike="noStrike">
+              <a:latin typeface="Arial"/>
+            </a:endParaRPr>
+          </a:p>
+          <a:p>
+            <a:pPr marL="432000" indent="-324000">
+              <a:spcBef>
+                <a:spcPts val="1417"/>
+              </a:spcBef>
+              <a:buClr>
+                <a:srgbClr val="ffffff"/>
+              </a:buClr>
+              <a:buSzPct val="45000"/>
+              <a:buFont typeface="Wingdings" charset="2"/>
+              <a:buChar char=""/>
+            </a:pPr>
+            <a:r>
+              <a:rPr b="0" lang="en-US" sz="3200" spc="-1" strike="noStrike">
+                <a:latin typeface="Arial"/>
+              </a:rPr>
+              <a:t>*gegarandeerde vaste positie na 1 jaar</a:t>
+            </a:r>
+            <a:endParaRPr b="0" lang="en-US" sz="3200" spc="-1" strike="noStrike">
+              <a:latin typeface="Arial"/>
+            </a:endParaRPr>
+          </a:p>
+        </p:txBody>
+      </p:sp>
+    </p:spTree>
+  </p:cSld>
+  <mc:AlternateContent>
+    <mc:Choice Requires="p14">
+      <p:transition spd="slow" p14:dur="2000"/>
+    </mc:Choice>
+    <mc:Fallback>
+      <p:transition spd="slow"/>
+    </mc:Fallback>
+  </mc:AlternateContent>
+</p:sld>
+</file>
+
+<file path=ppt/slides/slide9.xml><?xml version="1.0" encoding="utf-8"?>
+<p:sld xmlns:a="http://schemas.openxmlformats.org/drawingml/2006/main" xmlns:p="http://schemas.openxmlformats.org/presentationml/2006/main" xmlns:r="http://schemas.openxmlformats.org/officeDocument/2006/relationships" xmlns:p14="http://schemas.microsoft.com/office/powerpoint/2010/main" xmlns:p15="http://schemas.microsoft.com/office/powerpoint/2012/main" xmlns:mc="http://schemas.openxmlformats.org/markup-compatibility/2006">
+  <p:cSld>
+    <p:spTree>
+      <p:nvGrpSpPr>
+        <p:cNvPr id="1" name=""/>
+        <p:cNvGrpSpPr/>
+        <p:nvPr/>
+      </p:nvGrpSpPr>
+      <p:grpSpPr>
+        <a:xfrm>
+          <a:off x="0" y="0"/>
+          <a:ext cx="0" cy="0"/>
+          <a:chOff x="0" y="0"/>
+          <a:chExt cx="0" cy="0"/>
+        </a:xfrm>
+      </p:grpSpPr>
+      <p:sp>
+        <p:nvSpPr>
+          <p:cNvPr id="141" name="TextShape 1"/>
           <p:cNvSpPr txBox="1"/>
           <p:nvPr/>
         </p:nvSpPr>

</xml_diff>